<commit_message>
aggiunti punti nel db
</commit_message>
<xml_diff>
--- a/DIARIO DI BORDO/DB-01-12-25.pptx
+++ b/DIARIO DI BORDO/DB-01-12-25.pptx
@@ -4457,9 +4457,9 @@
         <p:grpSpPr>
           <a:xfrm>
             <a:off x="207205" y="186979"/>
-            <a:ext cx="19668373" cy="4223472"/>
+            <a:ext cx="19668373" cy="5008302"/>
             <a:chOff x="0" y="-16005"/>
-            <a:chExt cx="26224497" cy="5631295"/>
+            <a:chExt cx="26224497" cy="6677735"/>
           </a:xfrm>
         </p:grpSpPr>
         <p:sp>
@@ -4471,7 +4471,7 @@
           <p:spPr>
             <a:xfrm>
               <a:off x="638127" y="3646289"/>
-              <a:ext cx="20145326" cy="1969001"/>
+              <a:ext cx="20145326" cy="3015441"/>
             </a:xfrm>
             <a:prstGeom prst="rect">
               <a:avLst/>
@@ -4523,6 +4523,48 @@
                 </a:rPr>
                 <a:t>Quando definire requisiti del PoC e dove?</a:t>
               </a:r>
+            </a:p>
+            <a:p>
+              <a:pPr marL="988744" lvl="1" indent="-571500" algn="l">
+                <a:lnSpc>
+                  <a:spcPct val="150000"/>
+                </a:lnSpc>
+                <a:buFont typeface="Wingdings" panose="05000000000000000000" pitchFamily="2" charset="2"/>
+                <a:buChar char="Ø"/>
+              </a:pPr>
+              <a:r>
+                <a:rPr lang="it-IT" sz="3400" dirty="0">
+                  <a:solidFill>
+                    <a:srgbClr val="000000"/>
+                  </a:solidFill>
+                  <a:latin typeface="Overpass"/>
+                  <a:ea typeface="Overpass"/>
+                  <a:cs typeface="Arial" panose="020B0604020202020204" pitchFamily="34" charset="0"/>
+                  <a:sym typeface="Overpass"/>
+                </a:rPr>
+                <a:t>Chi redige il verbale? Un </a:t>
+              </a:r>
+              <a:r>
+                <a:rPr lang="it-IT" sz="3400">
+                  <a:solidFill>
+                    <a:srgbClr val="000000"/>
+                  </a:solidFill>
+                  <a:latin typeface="Overpass"/>
+                  <a:ea typeface="Overpass"/>
+                  <a:cs typeface="Arial" panose="020B0604020202020204" pitchFamily="34" charset="0"/>
+                  <a:sym typeface="Overpass"/>
+                </a:rPr>
+                <a:t>ruolo preciso?</a:t>
+              </a:r>
+              <a:endParaRPr lang="it-IT" sz="3400" dirty="0">
+                <a:solidFill>
+                  <a:srgbClr val="000000"/>
+                </a:solidFill>
+                <a:latin typeface="Overpass"/>
+                <a:ea typeface="Overpass"/>
+                <a:cs typeface="Arial" panose="020B0604020202020204" pitchFamily="34" charset="0"/>
+                <a:sym typeface="Overpass"/>
+              </a:endParaRPr>
             </a:p>
           </p:txBody>
         </p:sp>

</xml_diff>

<commit_message>
update diario di bordo 01-12-25
</commit_message>
<xml_diff>
--- a/DIARIO DI BORDO/DB-01-12-25.pptx
+++ b/DIARIO DI BORDO/DB-01-12-25.pptx
@@ -232,7 +232,7 @@
           <a:p>
             <a:fld id="{DC233B30-4F8C-4A4C-AB5E-3B02323E36F5}" type="datetimeFigureOut">
               <a:rPr lang="it-IT" smtClean="0"/>
-              <a:t>27/11/2025</a:t>
+              <a:t>01/12/2025</a:t>
             </a:fld>
             <a:endParaRPr lang="it-IT"/>
           </a:p>
@@ -770,7 +770,7 @@
             <a:fld id="{1D8BD707-D9CF-40AE-B4C6-C98DA3205C09}" type="datetimeFigureOut">
               <a:rPr lang="en-US" smtClean="0"/>
               <a:pPr/>
-              <a:t>11/27/2025</a:t>
+              <a:t>12/1/2025</a:t>
             </a:fld>
             <a:endParaRPr lang="en-US"/>
           </a:p>
@@ -935,7 +935,7 @@
             <a:fld id="{1D8BD707-D9CF-40AE-B4C6-C98DA3205C09}" type="datetimeFigureOut">
               <a:rPr lang="en-US" smtClean="0"/>
               <a:pPr/>
-              <a:t>11/27/2025</a:t>
+              <a:t>12/1/2025</a:t>
             </a:fld>
             <a:endParaRPr lang="en-US"/>
           </a:p>
@@ -1110,7 +1110,7 @@
             <a:fld id="{1D8BD707-D9CF-40AE-B4C6-C98DA3205C09}" type="datetimeFigureOut">
               <a:rPr lang="en-US" smtClean="0"/>
               <a:pPr/>
-              <a:t>11/27/2025</a:t>
+              <a:t>12/1/2025</a:t>
             </a:fld>
             <a:endParaRPr lang="en-US"/>
           </a:p>
@@ -1275,7 +1275,7 @@
             <a:fld id="{1D8BD707-D9CF-40AE-B4C6-C98DA3205C09}" type="datetimeFigureOut">
               <a:rPr lang="en-US" smtClean="0"/>
               <a:pPr/>
-              <a:t>11/27/2025</a:t>
+              <a:t>12/1/2025</a:t>
             </a:fld>
             <a:endParaRPr lang="en-US"/>
           </a:p>
@@ -1517,7 +1517,7 @@
             <a:fld id="{1D8BD707-D9CF-40AE-B4C6-C98DA3205C09}" type="datetimeFigureOut">
               <a:rPr lang="en-US" smtClean="0"/>
               <a:pPr/>
-              <a:t>11/27/2025</a:t>
+              <a:t>12/1/2025</a:t>
             </a:fld>
             <a:endParaRPr lang="en-US"/>
           </a:p>
@@ -1799,7 +1799,7 @@
             <a:fld id="{1D8BD707-D9CF-40AE-B4C6-C98DA3205C09}" type="datetimeFigureOut">
               <a:rPr lang="en-US" smtClean="0"/>
               <a:pPr/>
-              <a:t>11/27/2025</a:t>
+              <a:t>12/1/2025</a:t>
             </a:fld>
             <a:endParaRPr lang="en-US"/>
           </a:p>
@@ -2215,7 +2215,7 @@
             <a:fld id="{1D8BD707-D9CF-40AE-B4C6-C98DA3205C09}" type="datetimeFigureOut">
               <a:rPr lang="en-US" smtClean="0"/>
               <a:pPr/>
-              <a:t>11/27/2025</a:t>
+              <a:t>12/1/2025</a:t>
             </a:fld>
             <a:endParaRPr lang="en-US"/>
           </a:p>
@@ -2329,7 +2329,7 @@
             <a:fld id="{1D8BD707-D9CF-40AE-B4C6-C98DA3205C09}" type="datetimeFigureOut">
               <a:rPr lang="en-US" smtClean="0"/>
               <a:pPr/>
-              <a:t>11/27/2025</a:t>
+              <a:t>12/1/2025</a:t>
             </a:fld>
             <a:endParaRPr lang="en-US"/>
           </a:p>
@@ -2421,7 +2421,7 @@
             <a:fld id="{1D8BD707-D9CF-40AE-B4C6-C98DA3205C09}" type="datetimeFigureOut">
               <a:rPr lang="en-US" smtClean="0"/>
               <a:pPr/>
-              <a:t>11/27/2025</a:t>
+              <a:t>12/1/2025</a:t>
             </a:fld>
             <a:endParaRPr lang="en-US"/>
           </a:p>
@@ -2693,7 +2693,7 @@
             <a:fld id="{1D8BD707-D9CF-40AE-B4C6-C98DA3205C09}" type="datetimeFigureOut">
               <a:rPr lang="en-US" smtClean="0"/>
               <a:pPr/>
-              <a:t>11/27/2025</a:t>
+              <a:t>12/1/2025</a:t>
             </a:fld>
             <a:endParaRPr lang="en-US"/>
           </a:p>
@@ -2942,7 +2942,7 @@
             <a:fld id="{1D8BD707-D9CF-40AE-B4C6-C98DA3205C09}" type="datetimeFigureOut">
               <a:rPr lang="en-US" smtClean="0"/>
               <a:pPr/>
-              <a:t>11/27/2025</a:t>
+              <a:t>12/1/2025</a:t>
             </a:fld>
             <a:endParaRPr lang="en-US"/>
           </a:p>
@@ -3150,7 +3150,7 @@
             <a:fld id="{1D8BD707-D9CF-40AE-B4C6-C98DA3205C09}" type="datetimeFigureOut">
               <a:rPr lang="en-US" smtClean="0"/>
               <a:pPr/>
-              <a:t>11/27/2025</a:t>
+              <a:t>12/1/2025</a:t>
             </a:fld>
             <a:endParaRPr lang="en-US"/>
           </a:p>
@@ -4511,7 +4511,7 @@
               </a:pPr>
               <a:r>
                 <a:rPr lang="it-IT" sz="3600" dirty="0"/>
-                <a:t>Qual è il ruolo specifico incaricato della redazione dei verbali? Chi è incaricato della loro successiva verifica e approvazione?</a:t>
+                <a:t>Se il ruolo incaricato della stesura dei verbali è il responsabile, chi è incaricato della loro successiva verifica e approvazione?</a:t>
               </a:r>
               <a:endParaRPr lang="it-IT" sz="3400" dirty="0">
                 <a:solidFill>

</xml_diff>